<commit_message>
Added pdf, corrected typos
</commit_message>
<xml_diff>
--- a/Documents/Presentation Doc/Powerpoint/Presentation MyShelfie - Saccani, Spangaro, Pedersoli, Sanvito.pptx
+++ b/Documents/Presentation Doc/Powerpoint/Presentation MyShelfie - Saccani, Spangaro, Pedersoli, Sanvito.pptx
@@ -13686,23 +13686,7 @@
             </a:r>
             <a:r>
               <a:rPr lang="it-IT" sz="1800" dirty="0"/>
-              <a:t>Realizzare il server in modo che possa gestire più partite contemporaneamente. Ai ni dell'implementazione di questa funzionalità aggiuntiva, le regole precedentemente </a:t>
-            </a:r>
-            <a:r>
-              <a:rPr lang="it-IT" sz="1800" dirty="0" err="1"/>
-              <a:t>specicate</a:t>
-            </a:r>
-            <a:r>
-              <a:rPr lang="it-IT" sz="1800" dirty="0"/>
-              <a:t> in merito alla creazione delle partite possono essere </a:t>
-            </a:r>
-            <a:r>
-              <a:rPr lang="it-IT" sz="1800" dirty="0" err="1"/>
-              <a:t>modicate</a:t>
-            </a:r>
-            <a:r>
-              <a:rPr lang="it-IT" sz="1800" dirty="0"/>
-              <a:t> in base alle esigenze implementative o di interfaccia utente</a:t>
+              <a:t>Realizzare il server in modo che possa gestire più partite contemporaneamente. Ai fini dell'implementazione di questa funzionalità aggiuntiva, le regole precedentemente specificate in merito alla creazione delle partite possono essere modificate in base alle esigenze implementative o di interfaccia utente</a:t>
             </a:r>
             <a:r>
               <a:rPr lang="it-IT" sz="2200" dirty="0"/>
@@ -13720,23 +13704,7 @@
             </a:r>
             <a:r>
               <a:rPr lang="it-IT" sz="1800" dirty="0"/>
-              <a:t>Fare in modo che il server salvi periodicamente lo stato della partita su disco, in modo che l'esecuzione possa riprendere da dove si è interrotta anche a seguito del crash del server stesso. Per riprendere una partita, i giocatori si </a:t>
-            </a:r>
-            <a:r>
-              <a:rPr lang="it-IT" sz="1800" dirty="0" err="1"/>
-              <a:t>dovrenno</a:t>
-            </a:r>
-            <a:r>
-              <a:rPr lang="it-IT" sz="1800" dirty="0"/>
-              <a:t> ricollegare al server utilizzando gli stessi nickname una volta che questo sia tornato attivo. Si assume che il disco costituisca una memoria totalmente </a:t>
-            </a:r>
-            <a:r>
-              <a:rPr lang="it-IT" sz="1800" dirty="0" err="1"/>
-              <a:t>adabile</a:t>
-            </a:r>
-            <a:r>
-              <a:rPr lang="it-IT" sz="1800" dirty="0"/>
-              <a:t>. </a:t>
+              <a:t>Fare in modo che il server salvi periodicamente lo stato della partita su disco, in modo che l'esecuzione possa riprendere da dove si è interrotta, anche a seguito del crash del server stesso. Per riprendere una partita, i giocatori si dovranno ricollegare al server utilizzando gli stessi nickname, una volta che questo sia tornato attivo. Si assume che il disco costituisca una memoria totalmente affidabile. </a:t>
             </a:r>
           </a:p>
           <a:p>
@@ -13758,15 +13726,7 @@
             </a:r>
             <a:r>
               <a:rPr lang="it-IT" sz="1800" dirty="0"/>
-              <a:t>I giocatori disconnessi a seguito della caduta della rete o del crash del client, possono ricollegarsi e continuare la partita. Mentre un giocatore non è collegato, il gioco continua saltando i turni di quel giocatore. Se rimane attivo un solo giocatore, il gioco viene sospeso no a che non si ricollega almeno un altro giocatore oppure scade un </a:t>
-            </a:r>
-            <a:r>
-              <a:rPr lang="it-IT" sz="1800" dirty="0" err="1"/>
-              <a:t>timeout</a:t>
-            </a:r>
-            <a:r>
-              <a:rPr lang="it-IT" sz="1800" dirty="0"/>
-              <a:t> che decreta la vittoria dell'unico giocatore rimasto connesso. </a:t>
+              <a:t>I giocatori disconnessi a seguito della caduta della rete o del crash del client, possono ricollegarsi e continuare la partita. Mentre un giocatore non è collegato, il gioco continua saltando i turni di quel giocatore. Se rimane attivo un solo giocatore, il gioco viene sospeso a meno che non si ricolleghi almeno un altro giocatore, oppure scade un timer, che decreta la vittoria dell'unico giocatore rimasto connesso. </a:t>
             </a:r>
           </a:p>
           <a:p>
@@ -13780,15 +13740,7 @@
             </a:r>
             <a:r>
               <a:rPr lang="it-IT" sz="1800" dirty="0"/>
-              <a:t>Client e server devono </a:t>
-            </a:r>
-            <a:r>
-              <a:rPr lang="it-IT" sz="1800" dirty="0" err="1"/>
-              <a:t>orire</a:t>
-            </a:r>
-            <a:r>
-              <a:rPr lang="it-IT" sz="1800" dirty="0"/>
-              <a:t> la possibilità ai giocatori coinvolti in una partita di chattare tra di loro, inviando messaggi (</a:t>
+              <a:t>Client e server devono offrire la possibilità ai giocatori coinvolti in una partita di chattare tra di loro, inviando messaggi (</a:t>
             </a:r>
             <a:r>
               <a:rPr lang="it-IT" sz="1800" dirty="0">

</xml_diff>